<commit_message>
Atualização na validação de login
</commit_message>
<xml_diff>
--- a/Sprint2/Documentação/Apresentação Sprint 2.pptx
+++ b/Sprint2/Documentação/Apresentação Sprint 2.pptx
@@ -14767,7 +14767,7 @@
           <a:graphicData uri="http://schemas.openxmlformats.org/presentationml/2006/ole">
             <mc:AlternateContent xmlns:mc="http://schemas.openxmlformats.org/markup-compatibility/2006">
               <mc:Choice xmlns:v="urn:schemas-microsoft-com:vml" Requires="v">
-                <p:oleObj spid="_x0000_s1074" name="Worksheet" r:id="rId3" imgW="1228690" imgH="390708" progId="Excel.Sheet.12">
+                <p:oleObj spid="_x0000_s1078" name="Worksheet" r:id="rId3" imgW="1228690" imgH="390708" progId="Excel.Sheet.12">
                   <p:embed/>
                 </p:oleObj>
               </mc:Choice>
@@ -14830,7 +14830,7 @@
           <a:graphicData uri="http://schemas.openxmlformats.org/presentationml/2006/ole">
             <mc:AlternateContent xmlns:mc="http://schemas.openxmlformats.org/markup-compatibility/2006">
               <mc:Choice xmlns:v="urn:schemas-microsoft-com:vml" Requires="v">
-                <p:oleObj spid="_x0000_s1075" name="Worksheet" r:id="rId5" imgW="12611131" imgH="5343479" progId="Excel.Sheet.12">
+                <p:oleObj spid="_x0000_s1079" name="Worksheet" r:id="rId5" imgW="12611131" imgH="5343479" progId="Excel.Sheet.12">
                   <p:link updateAutomatic="1"/>
                 </p:oleObj>
               </mc:Choice>

</xml_diff>